<commit_message>
Update logic developer guide diagrams
</commit_message>
<xml_diff>
--- a/docs/diagrams/LogicComponentClassDiagram.pptx
+++ b/docs/diagrams/LogicComponentClassDiagram.pptx
@@ -208,7 +208,7 @@
           <a:p>
             <a:fld id="{F5CC4B3F-88C1-4FFA-B1B6-F41C21DC6924}" type="datetimeFigureOut">
               <a:rPr lang="en-US" smtClean="0"/>
-              <a:t>6/2/17</a:t>
+              <a:t>7/11/2017</a:t>
             </a:fld>
             <a:endParaRPr lang="en-US"/>
           </a:p>
@@ -654,7 +654,7 @@
           <a:p>
             <a:fld id="{78C97017-6FC3-485B-9764-EAC9E56C1D49}" type="datetimeFigureOut">
               <a:rPr lang="en-US" smtClean="0"/>
-              <a:t>6/2/17</a:t>
+              <a:t>7/11/2017</a:t>
             </a:fld>
             <a:endParaRPr lang="en-US"/>
           </a:p>
@@ -822,7 +822,7 @@
           <a:p>
             <a:fld id="{78C97017-6FC3-485B-9764-EAC9E56C1D49}" type="datetimeFigureOut">
               <a:rPr lang="en-US" smtClean="0"/>
-              <a:t>6/2/17</a:t>
+              <a:t>7/11/2017</a:t>
             </a:fld>
             <a:endParaRPr lang="en-US"/>
           </a:p>
@@ -1000,7 +1000,7 @@
           <a:p>
             <a:fld id="{78C97017-6FC3-485B-9764-EAC9E56C1D49}" type="datetimeFigureOut">
               <a:rPr lang="en-US" smtClean="0"/>
-              <a:t>6/2/17</a:t>
+              <a:t>7/11/2017</a:t>
             </a:fld>
             <a:endParaRPr lang="en-US"/>
           </a:p>
@@ -1168,7 +1168,7 @@
           <a:p>
             <a:fld id="{78C97017-6FC3-485B-9764-EAC9E56C1D49}" type="datetimeFigureOut">
               <a:rPr lang="en-US" smtClean="0"/>
-              <a:t>6/2/17</a:t>
+              <a:t>7/11/2017</a:t>
             </a:fld>
             <a:endParaRPr lang="en-US"/>
           </a:p>
@@ -1413,7 +1413,7 @@
           <a:p>
             <a:fld id="{78C97017-6FC3-485B-9764-EAC9E56C1D49}" type="datetimeFigureOut">
               <a:rPr lang="en-US" smtClean="0"/>
-              <a:t>6/2/17</a:t>
+              <a:t>7/11/2017</a:t>
             </a:fld>
             <a:endParaRPr lang="en-US"/>
           </a:p>
@@ -1698,7 +1698,7 @@
           <a:p>
             <a:fld id="{78C97017-6FC3-485B-9764-EAC9E56C1D49}" type="datetimeFigureOut">
               <a:rPr lang="en-US" smtClean="0"/>
-              <a:t>6/2/17</a:t>
+              <a:t>7/11/2017</a:t>
             </a:fld>
             <a:endParaRPr lang="en-US"/>
           </a:p>
@@ -2117,7 +2117,7 @@
           <a:p>
             <a:fld id="{78C97017-6FC3-485B-9764-EAC9E56C1D49}" type="datetimeFigureOut">
               <a:rPr lang="en-US" smtClean="0"/>
-              <a:t>6/2/17</a:t>
+              <a:t>7/11/2017</a:t>
             </a:fld>
             <a:endParaRPr lang="en-US"/>
           </a:p>
@@ -2234,7 +2234,7 @@
           <a:p>
             <a:fld id="{78C97017-6FC3-485B-9764-EAC9E56C1D49}" type="datetimeFigureOut">
               <a:rPr lang="en-US" smtClean="0"/>
-              <a:t>6/2/17</a:t>
+              <a:t>7/11/2017</a:t>
             </a:fld>
             <a:endParaRPr lang="en-US"/>
           </a:p>
@@ -2329,7 +2329,7 @@
           <a:p>
             <a:fld id="{78C97017-6FC3-485B-9764-EAC9E56C1D49}" type="datetimeFigureOut">
               <a:rPr lang="en-US" smtClean="0"/>
-              <a:t>6/2/17</a:t>
+              <a:t>7/11/2017</a:t>
             </a:fld>
             <a:endParaRPr lang="en-US"/>
           </a:p>
@@ -2604,7 +2604,7 @@
           <a:p>
             <a:fld id="{78C97017-6FC3-485B-9764-EAC9E56C1D49}" type="datetimeFigureOut">
               <a:rPr lang="en-US" smtClean="0"/>
-              <a:t>6/2/17</a:t>
+              <a:t>7/11/2017</a:t>
             </a:fld>
             <a:endParaRPr lang="en-US"/>
           </a:p>
@@ -2856,7 +2856,7 @@
           <a:p>
             <a:fld id="{78C97017-6FC3-485B-9764-EAC9E56C1D49}" type="datetimeFigureOut">
               <a:rPr lang="en-US" smtClean="0"/>
-              <a:t>6/2/17</a:t>
+              <a:t>7/11/2017</a:t>
             </a:fld>
             <a:endParaRPr lang="en-US"/>
           </a:p>
@@ -3067,7 +3067,7 @@
           <a:p>
             <a:fld id="{78C97017-6FC3-485B-9764-EAC9E56C1D49}" type="datetimeFigureOut">
               <a:rPr lang="en-US" smtClean="0"/>
-              <a:t>6/2/17</a:t>
+              <a:t>7/11/2017</a:t>
             </a:fld>
             <a:endParaRPr lang="en-US"/>
           </a:p>
@@ -3450,7 +3450,7 @@
         </p:nvSpPr>
         <p:spPr>
           <a:xfrm>
-            <a:off x="1066800" y="914400"/>
+            <a:off x="1110780" y="906536"/>
             <a:ext cx="7467600" cy="3733800"/>
           </a:xfrm>
           <a:prstGeom prst="roundRect">
@@ -3570,8 +3570,8 @@
         </p:nvSpPr>
         <p:spPr>
           <a:xfrm flipH="1">
-            <a:off x="6520227" y="2149167"/>
-            <a:ext cx="1093635" cy="346760"/>
+            <a:off x="6935076" y="2209800"/>
+            <a:ext cx="683251" cy="240345"/>
           </a:xfrm>
           <a:prstGeom prst="rect">
             <a:avLst/>
@@ -3603,14 +3603,25 @@
           <a:p>
             <a:pPr algn="ctr"/>
             <a:r>
-              <a:rPr lang="en-US" sz="1050" b="1" dirty="0" err="1">
+              <a:rPr lang="en-US" sz="800" b="1" dirty="0" smtClean="0">
                 <a:solidFill>
                   <a:srgbClr val="0070C0"/>
                 </a:solidFill>
               </a:rPr>
-              <a:t>AddCommand</a:t>
-            </a:r>
-            <a:endParaRPr lang="en-SG" sz="1050" b="1" dirty="0">
+              <a:t>Delete</a:t>
+            </a:r>
+          </a:p>
+          <a:p>
+            <a:pPr algn="ctr"/>
+            <a:r>
+              <a:rPr lang="en-US" sz="800" b="1" dirty="0" smtClean="0">
+                <a:solidFill>
+                  <a:srgbClr val="0070C0"/>
+                </a:solidFill>
+              </a:rPr>
+              <a:t>Command</a:t>
+            </a:r>
+            <a:endParaRPr lang="en-SG" sz="800" b="1" dirty="0">
               <a:solidFill>
                 <a:srgbClr val="0070C0"/>
               </a:solidFill>
@@ -3865,12 +3876,20 @@
           <a:p>
             <a:pPr algn="ctr"/>
             <a:r>
-              <a:rPr lang="en-US" sz="1050" b="1" dirty="0" err="1">
+              <a:rPr lang="en-US" sz="1050" b="1" dirty="0" err="1" smtClean="0">
                 <a:solidFill>
                   <a:srgbClr val="0070C0"/>
                 </a:solidFill>
               </a:rPr>
-              <a:t>FindCommand</a:t>
+              <a:t>Add</a:t>
+            </a:r>
+            <a:r>
+              <a:rPr lang="en-US" sz="1050" b="1" dirty="0" err="1" smtClean="0">
+                <a:solidFill>
+                  <a:srgbClr val="0070C0"/>
+                </a:solidFill>
+              </a:rPr>
+              <a:t>Command</a:t>
             </a:r>
             <a:endParaRPr lang="en-SG" sz="1050" b="1" dirty="0">
               <a:solidFill>
@@ -4829,12 +4848,20 @@
           <a:p>
             <a:pPr algn="ctr"/>
             <a:r>
-              <a:rPr lang="en-US" sz="1050" b="1" dirty="0" err="1">
+              <a:rPr lang="en-US" sz="1000" b="1" dirty="0" err="1" smtClean="0">
                 <a:solidFill>
                   <a:schemeClr val="bg1"/>
                 </a:solidFill>
               </a:rPr>
-              <a:t>AddCommand</a:t>
+              <a:t>Delete</a:t>
+            </a:r>
+            <a:r>
+              <a:rPr lang="en-US" sz="1000" b="1" dirty="0" err="1" smtClean="0">
+                <a:solidFill>
+                  <a:schemeClr val="bg1"/>
+                </a:solidFill>
+              </a:rPr>
+              <a:t>Command</a:t>
             </a:r>
             <a:endParaRPr lang="en-US" sz="1050" b="1" dirty="0">
               <a:solidFill>
@@ -4900,12 +4927,12 @@
           <a:p>
             <a:pPr algn="ctr"/>
             <a:r>
-              <a:rPr lang="en-US" sz="1050" b="1" dirty="0" err="1">
+              <a:rPr lang="en-US" sz="1050" b="1" dirty="0" err="1" smtClean="0">
                 <a:solidFill>
                   <a:schemeClr val="bg1"/>
                 </a:solidFill>
               </a:rPr>
-              <a:t>FindCommand</a:t>
+              <a:t>AddCommand</a:t>
             </a:r>
             <a:endParaRPr lang="en-US" sz="1050" b="1" dirty="0">
               <a:solidFill>
@@ -4994,7 +5021,7 @@
         </p:nvSpPr>
         <p:spPr>
           <a:xfrm>
-            <a:off x="3174214" y="1862795"/>
+            <a:off x="3166855" y="1642077"/>
             <a:ext cx="751107" cy="346760"/>
           </a:xfrm>
           <a:prstGeom prst="rect">
@@ -5139,9 +5166,9 @@
         </p:nvGrpSpPr>
         <p:grpSpPr>
           <a:xfrm rot="5400000">
-            <a:off x="6088711" y="1962201"/>
+            <a:off x="6011469" y="1348440"/>
             <a:ext cx="254462" cy="555486"/>
-            <a:chOff x="3949242" y="578739"/>
+            <a:chOff x="3706082" y="732721"/>
             <a:chExt cx="254462" cy="503902"/>
           </a:xfrm>
         </p:grpSpPr>
@@ -5153,7 +5180,7 @@
           </p:nvSpPr>
           <p:spPr>
             <a:xfrm rot="16200000">
-              <a:off x="3824522" y="703459"/>
+              <a:off x="3581362" y="857441"/>
               <a:ext cx="503902" cy="254462"/>
             </a:xfrm>
             <a:prstGeom prst="rect">
@@ -5195,7 +5222,7 @@
           </p:nvSpPr>
           <p:spPr>
             <a:xfrm rot="10800000" flipV="1">
-              <a:off x="3979474" y="617927"/>
+              <a:off x="3728327" y="758351"/>
               <a:ext cx="132157" cy="79956"/>
             </a:xfrm>
             <a:prstGeom prst="triangle">
@@ -5349,7 +5376,7 @@
         </p:nvSpPr>
         <p:spPr>
           <a:xfrm>
-            <a:off x="3186326" y="2841725"/>
+            <a:off x="3182006" y="2861121"/>
             <a:ext cx="731636" cy="283820"/>
           </a:xfrm>
           <a:prstGeom prst="rect">
@@ -5414,7 +5441,7 @@
         </p:nvSpPr>
         <p:spPr>
           <a:xfrm>
-            <a:off x="3186326" y="3190882"/>
+            <a:off x="3172941" y="3217280"/>
             <a:ext cx="731636" cy="283820"/>
           </a:xfrm>
           <a:prstGeom prst="rect">
@@ -5482,7 +5509,7 @@
         </p:nvCxnSpPr>
         <p:spPr>
           <a:xfrm flipH="1">
-            <a:off x="3917962" y="2983635"/>
+            <a:off x="3913642" y="3003031"/>
             <a:ext cx="335164" cy="0"/>
           </a:xfrm>
           <a:prstGeom prst="straightConnector1">
@@ -5526,7 +5553,7 @@
         </p:nvCxnSpPr>
         <p:spPr>
           <a:xfrm flipH="1">
-            <a:off x="3917962" y="3332439"/>
+            <a:off x="3904577" y="3358837"/>
             <a:ext cx="335164" cy="353"/>
           </a:xfrm>
           <a:prstGeom prst="straightConnector1">
@@ -5572,7 +5599,7 @@
         <p:spPr>
           <a:xfrm rot="10800000">
             <a:off x="2601618" y="2629061"/>
-            <a:ext cx="584708" cy="354574"/>
+            <a:ext cx="580388" cy="373970"/>
           </a:xfrm>
           <a:prstGeom prst="bentConnector2">
             <a:avLst/>
@@ -5615,9 +5642,9 @@
           <p:nvPr/>
         </p:nvCxnSpPr>
         <p:spPr>
-          <a:xfrm>
-            <a:off x="3925321" y="2036175"/>
-            <a:ext cx="327805" cy="107"/>
+          <a:xfrm flipV="1">
+            <a:off x="3917962" y="1809985"/>
+            <a:ext cx="358856" cy="5472"/>
           </a:xfrm>
           <a:prstGeom prst="line">
             <a:avLst/>
@@ -5661,8 +5688,8 @@
         </p:nvCxnSpPr>
         <p:spPr>
           <a:xfrm rot="10800000" flipV="1">
-            <a:off x="2601618" y="2036175"/>
-            <a:ext cx="572596" cy="418306"/>
+            <a:off x="2601619" y="1815457"/>
+            <a:ext cx="565237" cy="639024"/>
           </a:xfrm>
           <a:prstGeom prst="bentConnector2">
             <a:avLst/>
@@ -5976,8 +6003,8 @@
         </p:nvCxnSpPr>
         <p:spPr>
           <a:xfrm rot="16200000" flipV="1">
-            <a:off x="6890098" y="3046311"/>
-            <a:ext cx="1657928" cy="210400"/>
+            <a:off x="6896044" y="3052256"/>
+            <a:ext cx="1650502" cy="205935"/>
           </a:xfrm>
           <a:prstGeom prst="bentConnector2">
             <a:avLst/>
@@ -6193,14 +6220,14 @@
           <p:cNvCxnSpPr>
             <a:cxnSpLocks/>
             <a:stCxn id="42" idx="1"/>
-            <a:endCxn id="4" idx="3"/>
+            <a:endCxn id="97" idx="3"/>
           </p:cNvCxnSpPr>
           <p:nvPr/>
         </p:nvCxnSpPr>
         <p:spPr>
-          <a:xfrm>
-            <a:off x="5924929" y="2322317"/>
-            <a:ext cx="595298" cy="230"/>
+          <a:xfrm flipV="1">
+            <a:off x="5924929" y="1722038"/>
+            <a:ext cx="528373" cy="600279"/>
           </a:xfrm>
           <a:prstGeom prst="bentConnector3">
             <a:avLst>
@@ -6243,9 +6270,9 @@
           <p:nvPr/>
         </p:nvCxnSpPr>
         <p:spPr>
-          <a:xfrm>
-            <a:off x="4248488" y="2033984"/>
-            <a:ext cx="0" cy="1304815"/>
+          <a:xfrm flipH="1">
+            <a:off x="4248488" y="1815457"/>
+            <a:ext cx="6554" cy="1523342"/>
           </a:xfrm>
           <a:prstGeom prst="line">
             <a:avLst/>
@@ -6414,7 +6441,7 @@
         </p:nvSpPr>
         <p:spPr>
           <a:xfrm>
-            <a:off x="3174214" y="2370131"/>
+            <a:off x="3166713" y="2077527"/>
             <a:ext cx="750156" cy="340758"/>
           </a:xfrm>
           <a:prstGeom prst="rect">
@@ -6493,8 +6520,8 @@
         </p:nvCxnSpPr>
         <p:spPr>
           <a:xfrm rot="10800000" flipV="1">
-            <a:off x="2964740" y="2540509"/>
-            <a:ext cx="209475" cy="1261"/>
+            <a:off x="2964739" y="2247905"/>
+            <a:ext cx="201974" cy="293865"/>
           </a:xfrm>
           <a:prstGeom prst="bentConnector3">
             <a:avLst>
@@ -6541,8 +6568,8 @@
         </p:nvCxnSpPr>
         <p:spPr>
           <a:xfrm rot="5400000">
-            <a:off x="3469242" y="2289605"/>
-            <a:ext cx="160576" cy="476"/>
+            <a:off x="3497755" y="2032873"/>
+            <a:ext cx="88690" cy="618"/>
           </a:xfrm>
           <a:prstGeom prst="bentConnector3">
             <a:avLst>
@@ -6588,7 +6615,7 @@
         </p:nvCxnSpPr>
         <p:spPr>
           <a:xfrm flipV="1">
-            <a:off x="3924370" y="2535795"/>
+            <a:off x="3916869" y="2243191"/>
             <a:ext cx="322202" cy="4715"/>
           </a:xfrm>
           <a:prstGeom prst="line">
@@ -6768,6 +6795,431 @@
           </a:p>
         </p:txBody>
       </p:sp>
+      <p:sp>
+        <p:nvSpPr>
+          <p:cNvPr id="85" name="Rectangle 62"/>
+          <p:cNvSpPr/>
+          <p:nvPr/>
+        </p:nvSpPr>
+        <p:spPr>
+          <a:xfrm>
+            <a:off x="3185263" y="2503047"/>
+            <a:ext cx="731636" cy="283820"/>
+          </a:xfrm>
+          <a:prstGeom prst="rect">
+            <a:avLst/>
+          </a:prstGeom>
+          <a:solidFill>
+            <a:schemeClr val="accent5">
+              <a:lumMod val="60000"/>
+              <a:lumOff val="40000"/>
+            </a:schemeClr>
+          </a:solidFill>
+          <a:ln w="19050">
+            <a:solidFill>
+              <a:schemeClr val="accent5">
+                <a:lumMod val="60000"/>
+                <a:lumOff val="40000"/>
+              </a:schemeClr>
+            </a:solidFill>
+          </a:ln>
+          <a:effectLst/>
+        </p:spPr>
+        <p:style>
+          <a:lnRef idx="1">
+            <a:schemeClr val="accent2"/>
+          </a:lnRef>
+          <a:fillRef idx="2">
+            <a:schemeClr val="accent2"/>
+          </a:fillRef>
+          <a:effectRef idx="1">
+            <a:schemeClr val="accent2"/>
+          </a:effectRef>
+          <a:fontRef idx="minor">
+            <a:schemeClr val="dk1"/>
+          </a:fontRef>
+        </p:style>
+        <p:txBody>
+          <a:bodyPr rtlCol="0" anchor="ctr"/>
+          <a:lstStyle/>
+          <a:p>
+            <a:pPr algn="ctr"/>
+            <a:r>
+              <a:rPr lang="en-SG" sz="1050" dirty="0" err="1" smtClean="0">
+                <a:solidFill>
+                  <a:schemeClr val="bg1"/>
+                </a:solidFill>
+              </a:rPr>
+              <a:t>DateUtil</a:t>
+            </a:r>
+            <a:endParaRPr lang="en-SG" sz="1050" dirty="0">
+              <a:solidFill>
+                <a:schemeClr val="bg1"/>
+              </a:solidFill>
+            </a:endParaRPr>
+          </a:p>
+        </p:txBody>
+      </p:sp>
+      <p:cxnSp>
+        <p:nvCxnSpPr>
+          <p:cNvPr id="89" name="Straight Connector 88"/>
+          <p:cNvCxnSpPr>
+            <a:cxnSpLocks/>
+          </p:cNvCxnSpPr>
+          <p:nvPr/>
+        </p:nvCxnSpPr>
+        <p:spPr>
+          <a:xfrm flipV="1">
+            <a:off x="3920156" y="2611486"/>
+            <a:ext cx="322202" cy="4715"/>
+          </a:xfrm>
+          <a:prstGeom prst="line">
+            <a:avLst/>
+          </a:prstGeom>
+          <a:ln w="19050">
+            <a:solidFill>
+              <a:schemeClr val="accent5">
+                <a:lumMod val="50000"/>
+              </a:schemeClr>
+            </a:solidFill>
+            <a:prstDash val="sysDot"/>
+            <a:headEnd type="arrow" w="med" len="med"/>
+            <a:tailEnd type="none" w="med" len="med"/>
+          </a:ln>
+          <a:effectLst/>
+        </p:spPr>
+        <p:style>
+          <a:lnRef idx="1">
+            <a:schemeClr val="accent2"/>
+          </a:lnRef>
+          <a:fillRef idx="2">
+            <a:schemeClr val="accent2"/>
+          </a:fillRef>
+          <a:effectRef idx="1">
+            <a:schemeClr val="accent2"/>
+          </a:effectRef>
+          <a:fontRef idx="minor">
+            <a:schemeClr val="dk1"/>
+          </a:fontRef>
+        </p:style>
+      </p:cxnSp>
+      <p:sp>
+        <p:nvSpPr>
+          <p:cNvPr id="95" name="Rectangle 11"/>
+          <p:cNvSpPr/>
+          <p:nvPr/>
+        </p:nvSpPr>
+        <p:spPr>
+          <a:xfrm flipH="1">
+            <a:off x="6453302" y="1897181"/>
+            <a:ext cx="785697" cy="240345"/>
+          </a:xfrm>
+          <a:prstGeom prst="rect">
+            <a:avLst/>
+          </a:prstGeom>
+          <a:ln w="19050">
+            <a:solidFill>
+              <a:srgbClr val="0070C0"/>
+            </a:solidFill>
+          </a:ln>
+          <a:effectLst/>
+        </p:spPr>
+        <p:style>
+          <a:lnRef idx="1">
+            <a:schemeClr val="accent1"/>
+          </a:lnRef>
+          <a:fillRef idx="2">
+            <a:schemeClr val="accent1"/>
+          </a:fillRef>
+          <a:effectRef idx="1">
+            <a:schemeClr val="accent1"/>
+          </a:effectRef>
+          <a:fontRef idx="minor">
+            <a:schemeClr val="dk1"/>
+          </a:fontRef>
+        </p:style>
+        <p:txBody>
+          <a:bodyPr rtlCol="0" anchor="ctr"/>
+          <a:lstStyle/>
+          <a:p>
+            <a:pPr algn="ctr"/>
+            <a:r>
+              <a:rPr lang="en-US" sz="700" b="1" dirty="0" err="1" smtClean="0">
+                <a:solidFill>
+                  <a:srgbClr val="0070C0"/>
+                </a:solidFill>
+              </a:rPr>
+              <a:t>DeleteByIndex</a:t>
+            </a:r>
+            <a:endParaRPr lang="en-US" sz="700" b="1" dirty="0" smtClean="0">
+              <a:solidFill>
+                <a:srgbClr val="0070C0"/>
+              </a:solidFill>
+            </a:endParaRPr>
+          </a:p>
+          <a:p>
+            <a:pPr algn="ctr"/>
+            <a:r>
+              <a:rPr lang="en-US" sz="800" b="1" dirty="0" smtClean="0">
+                <a:solidFill>
+                  <a:srgbClr val="0070C0"/>
+                </a:solidFill>
+              </a:rPr>
+              <a:t>Command</a:t>
+            </a:r>
+            <a:endParaRPr lang="en-SG" sz="800" b="1" dirty="0">
+              <a:solidFill>
+                <a:srgbClr val="0070C0"/>
+              </a:solidFill>
+            </a:endParaRPr>
+          </a:p>
+        </p:txBody>
+      </p:sp>
+      <p:sp>
+        <p:nvSpPr>
+          <p:cNvPr id="97" name="Rectangle 11"/>
+          <p:cNvSpPr/>
+          <p:nvPr/>
+        </p:nvSpPr>
+        <p:spPr>
+          <a:xfrm flipH="1">
+            <a:off x="6453302" y="1601865"/>
+            <a:ext cx="785696" cy="240345"/>
+          </a:xfrm>
+          <a:prstGeom prst="rect">
+            <a:avLst/>
+          </a:prstGeom>
+          <a:ln w="19050">
+            <a:solidFill>
+              <a:srgbClr val="0070C0"/>
+            </a:solidFill>
+          </a:ln>
+          <a:effectLst/>
+        </p:spPr>
+        <p:style>
+          <a:lnRef idx="1">
+            <a:schemeClr val="accent1"/>
+          </a:lnRef>
+          <a:fillRef idx="2">
+            <a:schemeClr val="accent1"/>
+          </a:fillRef>
+          <a:effectRef idx="1">
+            <a:schemeClr val="accent1"/>
+          </a:effectRef>
+          <a:fontRef idx="minor">
+            <a:schemeClr val="dk1"/>
+          </a:fontRef>
+        </p:style>
+        <p:txBody>
+          <a:bodyPr rtlCol="0" anchor="ctr"/>
+          <a:lstStyle/>
+          <a:p>
+            <a:pPr algn="ctr"/>
+            <a:r>
+              <a:rPr lang="en-US" sz="700" b="1" dirty="0" err="1" smtClean="0">
+                <a:solidFill>
+                  <a:srgbClr val="0070C0"/>
+                </a:solidFill>
+              </a:rPr>
+              <a:t>DeleteByFind</a:t>
+            </a:r>
+            <a:endParaRPr lang="en-US" sz="700" b="1" dirty="0" smtClean="0">
+              <a:solidFill>
+                <a:srgbClr val="0070C0"/>
+              </a:solidFill>
+            </a:endParaRPr>
+          </a:p>
+          <a:p>
+            <a:pPr algn="ctr"/>
+            <a:r>
+              <a:rPr lang="en-US" sz="800" b="1" dirty="0" smtClean="0">
+                <a:solidFill>
+                  <a:srgbClr val="0070C0"/>
+                </a:solidFill>
+              </a:rPr>
+              <a:t>Command</a:t>
+            </a:r>
+            <a:endParaRPr lang="en-SG" sz="800" b="1" dirty="0">
+              <a:solidFill>
+                <a:srgbClr val="0070C0"/>
+              </a:solidFill>
+            </a:endParaRPr>
+          </a:p>
+        </p:txBody>
+      </p:sp>
+      <p:cxnSp>
+        <p:nvCxnSpPr>
+          <p:cNvPr id="98" name="Elbow Connector 63"/>
+          <p:cNvCxnSpPr>
+            <a:cxnSpLocks/>
+            <a:stCxn id="42" idx="1"/>
+          </p:cNvCxnSpPr>
+          <p:nvPr/>
+        </p:nvCxnSpPr>
+        <p:spPr>
+          <a:xfrm flipV="1">
+            <a:off x="5924929" y="2033182"/>
+            <a:ext cx="511881" cy="289135"/>
+          </a:xfrm>
+          <a:prstGeom prst="bentConnector3">
+            <a:avLst>
+              <a:gd name="adj1" fmla="val 50000"/>
+            </a:avLst>
+          </a:prstGeom>
+          <a:ln w="19050">
+            <a:solidFill>
+              <a:schemeClr val="accent5">
+                <a:lumMod val="75000"/>
+              </a:schemeClr>
+            </a:solidFill>
+            <a:prstDash val="sysDot"/>
+            <a:headEnd type="none" w="med" len="med"/>
+            <a:tailEnd type="arrow" w="med" len="med"/>
+          </a:ln>
+          <a:effectLst/>
+        </p:spPr>
+        <p:style>
+          <a:lnRef idx="1">
+            <a:schemeClr val="accent2"/>
+          </a:lnRef>
+          <a:fillRef idx="2">
+            <a:schemeClr val="accent2"/>
+          </a:fillRef>
+          <a:effectRef idx="1">
+            <a:schemeClr val="accent2"/>
+          </a:effectRef>
+          <a:fontRef idx="minor">
+            <a:schemeClr val="dk1"/>
+          </a:fontRef>
+        </p:style>
+      </p:cxnSp>
+      <p:cxnSp>
+        <p:nvCxnSpPr>
+          <p:cNvPr id="108" name="Elbow Connector 107"/>
+          <p:cNvCxnSpPr>
+            <a:stCxn id="114" idx="3"/>
+            <a:endCxn id="97" idx="1"/>
+          </p:cNvCxnSpPr>
+          <p:nvPr/>
+        </p:nvCxnSpPr>
+        <p:spPr>
+          <a:xfrm rot="16200000" flipV="1">
+            <a:off x="7197970" y="1763066"/>
+            <a:ext cx="306514" cy="224457"/>
+          </a:xfrm>
+          <a:prstGeom prst="bentConnector2">
+            <a:avLst/>
+          </a:prstGeom>
+          <a:ln w="19050">
+            <a:headEnd type="none" w="med" len="med"/>
+            <a:tailEnd type="none" w="med" len="med"/>
+          </a:ln>
+        </p:spPr>
+        <p:style>
+          <a:lnRef idx="1">
+            <a:schemeClr val="accent1"/>
+          </a:lnRef>
+          <a:fillRef idx="0">
+            <a:schemeClr val="accent1"/>
+          </a:fillRef>
+          <a:effectRef idx="0">
+            <a:schemeClr val="accent1"/>
+          </a:effectRef>
+          <a:fontRef idx="minor">
+            <a:schemeClr val="tx1"/>
+          </a:fontRef>
+        </p:style>
+      </p:cxnSp>
+      <p:sp>
+        <p:nvSpPr>
+          <p:cNvPr id="114" name="Isosceles Triangle 102"/>
+          <p:cNvSpPr/>
+          <p:nvPr/>
+        </p:nvSpPr>
+        <p:spPr>
+          <a:xfrm flipV="1">
+            <a:off x="7328203" y="2028552"/>
+            <a:ext cx="270504" cy="175523"/>
+          </a:xfrm>
+          <a:prstGeom prst="triangle">
+            <a:avLst/>
+          </a:prstGeom>
+          <a:solidFill>
+            <a:schemeClr val="tx2">
+              <a:lumMod val="60000"/>
+              <a:lumOff val="40000"/>
+            </a:schemeClr>
+          </a:solidFill>
+          <a:ln w="19050">
+            <a:solidFill>
+              <a:srgbClr val="0070C0"/>
+            </a:solidFill>
+          </a:ln>
+          <a:effectLst/>
+        </p:spPr>
+        <p:style>
+          <a:lnRef idx="1">
+            <a:schemeClr val="accent1"/>
+          </a:lnRef>
+          <a:fillRef idx="2">
+            <a:schemeClr val="accent1"/>
+          </a:fillRef>
+          <a:effectRef idx="1">
+            <a:schemeClr val="accent1"/>
+          </a:effectRef>
+          <a:fontRef idx="minor">
+            <a:schemeClr val="dk1"/>
+          </a:fontRef>
+        </p:style>
+        <p:txBody>
+          <a:bodyPr rtlCol="0" anchor="ctr"/>
+          <a:lstStyle/>
+          <a:p>
+            <a:pPr algn="ctr"/>
+            <a:endParaRPr lang="en-SG" sz="1050" b="1">
+              <a:solidFill>
+                <a:srgbClr val="92D050"/>
+              </a:solidFill>
+            </a:endParaRPr>
+          </a:p>
+        </p:txBody>
+      </p:sp>
+      <p:cxnSp>
+        <p:nvCxnSpPr>
+          <p:cNvPr id="117" name="Elbow Connector 116"/>
+          <p:cNvCxnSpPr/>
+          <p:nvPr/>
+        </p:nvCxnSpPr>
+        <p:spPr>
+          <a:xfrm rot="10800000" flipV="1">
+            <a:off x="7249098" y="1972466"/>
+            <a:ext cx="207370" cy="535"/>
+          </a:xfrm>
+          <a:prstGeom prst="bentConnector3">
+            <a:avLst>
+              <a:gd name="adj1" fmla="val 50000"/>
+            </a:avLst>
+          </a:prstGeom>
+          <a:ln w="19050">
+            <a:headEnd type="none" w="med" len="med"/>
+            <a:tailEnd type="none" w="med" len="med"/>
+          </a:ln>
+        </p:spPr>
+        <p:style>
+          <a:lnRef idx="1">
+            <a:schemeClr val="accent1"/>
+          </a:lnRef>
+          <a:fillRef idx="0">
+            <a:schemeClr val="accent1"/>
+          </a:fillRef>
+          <a:effectRef idx="0">
+            <a:schemeClr val="accent1"/>
+          </a:effectRef>
+          <a:fontRef idx="minor">
+            <a:schemeClr val="tx1"/>
+          </a:fontRef>
+        </p:style>
+      </p:cxnSp>
     </p:spTree>
     <p:extLst>
       <p:ext uri="{BB962C8B-B14F-4D97-AF65-F5344CB8AC3E}">

</xml_diff>